<commit_message>
Add functions to the documentation
</commit_message>
<xml_diff>
--- a/Documentation/Presentation - CrazyCow.pptx
+++ b/Documentation/Presentation - CrazyCow.pptx
@@ -21313,492 +21313,6 @@
       </p:sp>
       <p:grpSp>
         <p:nvGrpSpPr>
-          <p:cNvPr id="602" name="Google Shape;602;p27"/>
-          <p:cNvGrpSpPr/>
-          <p:nvPr/>
-        </p:nvGrpSpPr>
-        <p:grpSpPr>
-          <a:xfrm>
-            <a:off x="8372779" y="645848"/>
-            <a:ext cx="374779" cy="350950"/>
-            <a:chOff x="4826800" y="1400925"/>
-            <a:chExt cx="374779" cy="350950"/>
-          </a:xfrm>
-        </p:grpSpPr>
-        <p:sp>
-          <p:nvSpPr>
-            <p:cNvPr id="603" name="Google Shape;603;p27"/>
-            <p:cNvSpPr/>
-            <p:nvPr/>
-          </p:nvSpPr>
-          <p:spPr>
-            <a:xfrm>
-              <a:off x="4826800" y="1400925"/>
-              <a:ext cx="346950" cy="350950"/>
-            </a:xfrm>
-            <a:custGeom>
-              <a:avLst/>
-              <a:gdLst/>
-              <a:ahLst/>
-              <a:cxnLst/>
-              <a:rect l="l" t="t" r="r" b="b"/>
-              <a:pathLst>
-                <a:path w="13878" h="14038" extrusionOk="0">
-                  <a:moveTo>
-                    <a:pt x="11774" y="1"/>
-                  </a:moveTo>
-                  <a:cubicBezTo>
-                    <a:pt x="10765" y="1"/>
-                    <a:pt x="9884" y="878"/>
-                    <a:pt x="9308" y="1728"/>
-                  </a:cubicBezTo>
-                  <a:cubicBezTo>
-                    <a:pt x="8674" y="2662"/>
-                    <a:pt x="8307" y="3696"/>
-                    <a:pt x="7773" y="4630"/>
-                  </a:cubicBezTo>
-                  <a:cubicBezTo>
-                    <a:pt x="7139" y="3463"/>
-                    <a:pt x="6239" y="2429"/>
-                    <a:pt x="5105" y="1695"/>
-                  </a:cubicBezTo>
-                  <a:cubicBezTo>
-                    <a:pt x="4556" y="1306"/>
-                    <a:pt x="3914" y="1113"/>
-                    <a:pt x="3267" y="1113"/>
-                  </a:cubicBezTo>
-                  <a:cubicBezTo>
-                    <a:pt x="2695" y="1113"/>
-                    <a:pt x="2119" y="1264"/>
-                    <a:pt x="1602" y="1562"/>
-                  </a:cubicBezTo>
-                  <a:cubicBezTo>
-                    <a:pt x="134" y="2496"/>
-                    <a:pt x="1" y="4730"/>
-                    <a:pt x="768" y="6298"/>
-                  </a:cubicBezTo>
-                  <a:cubicBezTo>
-                    <a:pt x="1569" y="7866"/>
-                    <a:pt x="3003" y="8967"/>
-                    <a:pt x="4337" y="10134"/>
-                  </a:cubicBezTo>
-                  <a:cubicBezTo>
-                    <a:pt x="5738" y="11335"/>
-                    <a:pt x="7073" y="12636"/>
-                    <a:pt x="8307" y="14037"/>
-                  </a:cubicBezTo>
-                  <a:cubicBezTo>
-                    <a:pt x="10475" y="11268"/>
-                    <a:pt x="12176" y="8166"/>
-                    <a:pt x="13344" y="4864"/>
-                  </a:cubicBezTo>
-                  <a:cubicBezTo>
-                    <a:pt x="13744" y="3997"/>
-                    <a:pt x="13878" y="3029"/>
-                    <a:pt x="13811" y="2062"/>
-                  </a:cubicBezTo>
-                  <a:cubicBezTo>
-                    <a:pt x="13677" y="1128"/>
-                    <a:pt x="13044" y="194"/>
-                    <a:pt x="12076" y="27"/>
-                  </a:cubicBezTo>
-                  <a:cubicBezTo>
-                    <a:pt x="11974" y="9"/>
-                    <a:pt x="11873" y="1"/>
-                    <a:pt x="11774" y="1"/>
-                  </a:cubicBezTo>
-                  <a:close/>
-                </a:path>
-              </a:pathLst>
-            </a:custGeom>
-            <a:solidFill>
-              <a:schemeClr val="accent5"/>
-            </a:solidFill>
-            <a:ln>
-              <a:noFill/>
-            </a:ln>
-          </p:spPr>
-          <p:txBody>
-            <a:bodyPr spcFirstLastPara="1" wrap="square" lIns="91425" tIns="91425" rIns="91425" bIns="91425" anchor="ctr" anchorCtr="0">
-              <a:noAutofit/>
-            </a:bodyPr>
-            <a:lstStyle/>
-            <a:p>
-              <a:pPr marL="0" lvl="0" indent="0" algn="l" rtl="0">
-                <a:spcBef>
-                  <a:spcPts val="0"/>
-                </a:spcBef>
-                <a:spcAft>
-                  <a:spcPts val="0"/>
-                </a:spcAft>
-                <a:buNone/>
-              </a:pPr>
-              <a:endParaRPr/>
-            </a:p>
-          </p:txBody>
-        </p:sp>
-        <p:sp>
-          <p:nvSpPr>
-            <p:cNvPr id="604" name="Google Shape;604;p27"/>
-            <p:cNvSpPr/>
-            <p:nvPr/>
-          </p:nvSpPr>
-          <p:spPr>
-            <a:xfrm>
-              <a:off x="4854629" y="1400925"/>
-              <a:ext cx="346950" cy="350950"/>
-            </a:xfrm>
-            <a:custGeom>
-              <a:avLst/>
-              <a:gdLst/>
-              <a:ahLst/>
-              <a:cxnLst/>
-              <a:rect l="l" t="t" r="r" b="b"/>
-              <a:pathLst>
-                <a:path w="13878" h="14038" extrusionOk="0">
-                  <a:moveTo>
-                    <a:pt x="11774" y="1"/>
-                  </a:moveTo>
-                  <a:cubicBezTo>
-                    <a:pt x="10765" y="1"/>
-                    <a:pt x="9884" y="878"/>
-                    <a:pt x="9308" y="1728"/>
-                  </a:cubicBezTo>
-                  <a:cubicBezTo>
-                    <a:pt x="8674" y="2662"/>
-                    <a:pt x="8307" y="3696"/>
-                    <a:pt x="7773" y="4630"/>
-                  </a:cubicBezTo>
-                  <a:cubicBezTo>
-                    <a:pt x="7139" y="3463"/>
-                    <a:pt x="6239" y="2429"/>
-                    <a:pt x="5105" y="1695"/>
-                  </a:cubicBezTo>
-                  <a:cubicBezTo>
-                    <a:pt x="4556" y="1306"/>
-                    <a:pt x="3914" y="1113"/>
-                    <a:pt x="3267" y="1113"/>
-                  </a:cubicBezTo>
-                  <a:cubicBezTo>
-                    <a:pt x="2695" y="1113"/>
-                    <a:pt x="2119" y="1264"/>
-                    <a:pt x="1602" y="1562"/>
-                  </a:cubicBezTo>
-                  <a:cubicBezTo>
-                    <a:pt x="134" y="2496"/>
-                    <a:pt x="1" y="4730"/>
-                    <a:pt x="768" y="6298"/>
-                  </a:cubicBezTo>
-                  <a:cubicBezTo>
-                    <a:pt x="1569" y="7866"/>
-                    <a:pt x="3003" y="8967"/>
-                    <a:pt x="4337" y="10134"/>
-                  </a:cubicBezTo>
-                  <a:cubicBezTo>
-                    <a:pt x="5738" y="11335"/>
-                    <a:pt x="7073" y="12636"/>
-                    <a:pt x="8307" y="14037"/>
-                  </a:cubicBezTo>
-                  <a:cubicBezTo>
-                    <a:pt x="10475" y="11268"/>
-                    <a:pt x="12176" y="8166"/>
-                    <a:pt x="13344" y="4864"/>
-                  </a:cubicBezTo>
-                  <a:cubicBezTo>
-                    <a:pt x="13744" y="3997"/>
-                    <a:pt x="13878" y="3029"/>
-                    <a:pt x="13811" y="2062"/>
-                  </a:cubicBezTo>
-                  <a:cubicBezTo>
-                    <a:pt x="13677" y="1128"/>
-                    <a:pt x="13044" y="194"/>
-                    <a:pt x="12076" y="27"/>
-                  </a:cubicBezTo>
-                  <a:cubicBezTo>
-                    <a:pt x="11974" y="9"/>
-                    <a:pt x="11873" y="1"/>
-                    <a:pt x="11774" y="1"/>
-                  </a:cubicBezTo>
-                  <a:close/>
-                </a:path>
-              </a:pathLst>
-            </a:custGeom>
-            <a:noFill/>
-            <a:ln w="19050" cap="flat" cmpd="sng">
-              <a:solidFill>
-                <a:schemeClr val="dk2"/>
-              </a:solidFill>
-              <a:prstDash val="solid"/>
-              <a:round/>
-              <a:headEnd type="none" w="sm" len="sm"/>
-              <a:tailEnd type="none" w="sm" len="sm"/>
-            </a:ln>
-          </p:spPr>
-          <p:txBody>
-            <a:bodyPr spcFirstLastPara="1" wrap="square" lIns="91425" tIns="91425" rIns="91425" bIns="91425" anchor="ctr" anchorCtr="0">
-              <a:noAutofit/>
-            </a:bodyPr>
-            <a:lstStyle/>
-            <a:p>
-              <a:pPr marL="0" lvl="0" indent="0" algn="l" rtl="0">
-                <a:spcBef>
-                  <a:spcPts val="0"/>
-                </a:spcBef>
-                <a:spcAft>
-                  <a:spcPts val="0"/>
-                </a:spcAft>
-                <a:buNone/>
-              </a:pPr>
-              <a:endParaRPr/>
-            </a:p>
-          </p:txBody>
-        </p:sp>
-      </p:grpSp>
-      <p:grpSp>
-        <p:nvGrpSpPr>
-          <p:cNvPr id="605" name="Google Shape;605;p27"/>
-          <p:cNvGrpSpPr/>
-          <p:nvPr/>
-        </p:nvGrpSpPr>
-        <p:grpSpPr>
-          <a:xfrm>
-            <a:off x="7855894" y="1010187"/>
-            <a:ext cx="379976" cy="350963"/>
-            <a:chOff x="5162486" y="3741525"/>
-            <a:chExt cx="379976" cy="350963"/>
-          </a:xfrm>
-        </p:grpSpPr>
-        <p:sp>
-          <p:nvSpPr>
-            <p:cNvPr id="606" name="Google Shape;606;p27"/>
-            <p:cNvSpPr/>
-            <p:nvPr/>
-          </p:nvSpPr>
-          <p:spPr>
-            <a:xfrm flipH="1">
-              <a:off x="5195513" y="3741538"/>
-              <a:ext cx="346950" cy="350950"/>
-            </a:xfrm>
-            <a:custGeom>
-              <a:avLst/>
-              <a:gdLst/>
-              <a:ahLst/>
-              <a:cxnLst/>
-              <a:rect l="l" t="t" r="r" b="b"/>
-              <a:pathLst>
-                <a:path w="13878" h="14038" extrusionOk="0">
-                  <a:moveTo>
-                    <a:pt x="11774" y="1"/>
-                  </a:moveTo>
-                  <a:cubicBezTo>
-                    <a:pt x="10765" y="1"/>
-                    <a:pt x="9884" y="878"/>
-                    <a:pt x="9308" y="1728"/>
-                  </a:cubicBezTo>
-                  <a:cubicBezTo>
-                    <a:pt x="8674" y="2662"/>
-                    <a:pt x="8307" y="3696"/>
-                    <a:pt x="7773" y="4630"/>
-                  </a:cubicBezTo>
-                  <a:cubicBezTo>
-                    <a:pt x="7139" y="3463"/>
-                    <a:pt x="6239" y="2429"/>
-                    <a:pt x="5105" y="1695"/>
-                  </a:cubicBezTo>
-                  <a:cubicBezTo>
-                    <a:pt x="4556" y="1306"/>
-                    <a:pt x="3914" y="1113"/>
-                    <a:pt x="3267" y="1113"/>
-                  </a:cubicBezTo>
-                  <a:cubicBezTo>
-                    <a:pt x="2695" y="1113"/>
-                    <a:pt x="2119" y="1264"/>
-                    <a:pt x="1602" y="1562"/>
-                  </a:cubicBezTo>
-                  <a:cubicBezTo>
-                    <a:pt x="134" y="2496"/>
-                    <a:pt x="1" y="4730"/>
-                    <a:pt x="768" y="6298"/>
-                  </a:cubicBezTo>
-                  <a:cubicBezTo>
-                    <a:pt x="1569" y="7866"/>
-                    <a:pt x="3003" y="8967"/>
-                    <a:pt x="4337" y="10134"/>
-                  </a:cubicBezTo>
-                  <a:cubicBezTo>
-                    <a:pt x="5738" y="11335"/>
-                    <a:pt x="7073" y="12636"/>
-                    <a:pt x="8307" y="14037"/>
-                  </a:cubicBezTo>
-                  <a:cubicBezTo>
-                    <a:pt x="10475" y="11268"/>
-                    <a:pt x="12176" y="8166"/>
-                    <a:pt x="13344" y="4864"/>
-                  </a:cubicBezTo>
-                  <a:cubicBezTo>
-                    <a:pt x="13744" y="3997"/>
-                    <a:pt x="13878" y="3029"/>
-                    <a:pt x="13811" y="2062"/>
-                  </a:cubicBezTo>
-                  <a:cubicBezTo>
-                    <a:pt x="13677" y="1128"/>
-                    <a:pt x="13044" y="194"/>
-                    <a:pt x="12076" y="27"/>
-                  </a:cubicBezTo>
-                  <a:cubicBezTo>
-                    <a:pt x="11974" y="9"/>
-                    <a:pt x="11873" y="1"/>
-                    <a:pt x="11774" y="1"/>
-                  </a:cubicBezTo>
-                  <a:close/>
-                </a:path>
-              </a:pathLst>
-            </a:custGeom>
-            <a:solidFill>
-              <a:schemeClr val="accent5"/>
-            </a:solidFill>
-            <a:ln>
-              <a:noFill/>
-            </a:ln>
-          </p:spPr>
-          <p:txBody>
-            <a:bodyPr spcFirstLastPara="1" wrap="square" lIns="91425" tIns="91425" rIns="91425" bIns="91425" anchor="ctr" anchorCtr="0">
-              <a:noAutofit/>
-            </a:bodyPr>
-            <a:lstStyle/>
-            <a:p>
-              <a:pPr marL="0" lvl="0" indent="0" algn="l" rtl="0">
-                <a:spcBef>
-                  <a:spcPts val="0"/>
-                </a:spcBef>
-                <a:spcAft>
-                  <a:spcPts val="0"/>
-                </a:spcAft>
-                <a:buNone/>
-              </a:pPr>
-              <a:endParaRPr/>
-            </a:p>
-          </p:txBody>
-        </p:sp>
-        <p:sp>
-          <p:nvSpPr>
-            <p:cNvPr id="607" name="Google Shape;607;p27"/>
-            <p:cNvSpPr/>
-            <p:nvPr/>
-          </p:nvSpPr>
-          <p:spPr>
-            <a:xfrm flipH="1">
-              <a:off x="5162486" y="3741525"/>
-              <a:ext cx="346950" cy="350950"/>
-            </a:xfrm>
-            <a:custGeom>
-              <a:avLst/>
-              <a:gdLst/>
-              <a:ahLst/>
-              <a:cxnLst/>
-              <a:rect l="l" t="t" r="r" b="b"/>
-              <a:pathLst>
-                <a:path w="13878" h="14038" extrusionOk="0">
-                  <a:moveTo>
-                    <a:pt x="11774" y="1"/>
-                  </a:moveTo>
-                  <a:cubicBezTo>
-                    <a:pt x="10765" y="1"/>
-                    <a:pt x="9884" y="878"/>
-                    <a:pt x="9308" y="1728"/>
-                  </a:cubicBezTo>
-                  <a:cubicBezTo>
-                    <a:pt x="8674" y="2662"/>
-                    <a:pt x="8307" y="3696"/>
-                    <a:pt x="7773" y="4630"/>
-                  </a:cubicBezTo>
-                  <a:cubicBezTo>
-                    <a:pt x="7139" y="3463"/>
-                    <a:pt x="6239" y="2429"/>
-                    <a:pt x="5105" y="1695"/>
-                  </a:cubicBezTo>
-                  <a:cubicBezTo>
-                    <a:pt x="4556" y="1306"/>
-                    <a:pt x="3914" y="1113"/>
-                    <a:pt x="3267" y="1113"/>
-                  </a:cubicBezTo>
-                  <a:cubicBezTo>
-                    <a:pt x="2695" y="1113"/>
-                    <a:pt x="2119" y="1264"/>
-                    <a:pt x="1602" y="1562"/>
-                  </a:cubicBezTo>
-                  <a:cubicBezTo>
-                    <a:pt x="134" y="2496"/>
-                    <a:pt x="1" y="4730"/>
-                    <a:pt x="768" y="6298"/>
-                  </a:cubicBezTo>
-                  <a:cubicBezTo>
-                    <a:pt x="1569" y="7866"/>
-                    <a:pt x="3003" y="8967"/>
-                    <a:pt x="4337" y="10134"/>
-                  </a:cubicBezTo>
-                  <a:cubicBezTo>
-                    <a:pt x="5738" y="11335"/>
-                    <a:pt x="7073" y="12636"/>
-                    <a:pt x="8307" y="14037"/>
-                  </a:cubicBezTo>
-                  <a:cubicBezTo>
-                    <a:pt x="10475" y="11268"/>
-                    <a:pt x="12176" y="8166"/>
-                    <a:pt x="13344" y="4864"/>
-                  </a:cubicBezTo>
-                  <a:cubicBezTo>
-                    <a:pt x="13744" y="3997"/>
-                    <a:pt x="13878" y="3029"/>
-                    <a:pt x="13811" y="2062"/>
-                  </a:cubicBezTo>
-                  <a:cubicBezTo>
-                    <a:pt x="13677" y="1128"/>
-                    <a:pt x="13044" y="194"/>
-                    <a:pt x="12076" y="27"/>
-                  </a:cubicBezTo>
-                  <a:cubicBezTo>
-                    <a:pt x="11974" y="9"/>
-                    <a:pt x="11873" y="1"/>
-                    <a:pt x="11774" y="1"/>
-                  </a:cubicBezTo>
-                  <a:close/>
-                </a:path>
-              </a:pathLst>
-            </a:custGeom>
-            <a:noFill/>
-            <a:ln w="19050" cap="flat" cmpd="sng">
-              <a:solidFill>
-                <a:schemeClr val="dk2"/>
-              </a:solidFill>
-              <a:prstDash val="solid"/>
-              <a:round/>
-              <a:headEnd type="none" w="sm" len="sm"/>
-              <a:tailEnd type="none" w="sm" len="sm"/>
-            </a:ln>
-          </p:spPr>
-          <p:txBody>
-            <a:bodyPr spcFirstLastPara="1" wrap="square" lIns="91425" tIns="91425" rIns="91425" bIns="91425" anchor="ctr" anchorCtr="0">
-              <a:noAutofit/>
-            </a:bodyPr>
-            <a:lstStyle/>
-            <a:p>
-              <a:pPr marL="0" lvl="0" indent="0" algn="l" rtl="0">
-                <a:spcBef>
-                  <a:spcPts val="0"/>
-                </a:spcBef>
-                <a:spcAft>
-                  <a:spcPts val="0"/>
-                </a:spcAft>
-                <a:buNone/>
-              </a:pPr>
-              <a:endParaRPr/>
-            </a:p>
-          </p:txBody>
-        </p:sp>
-      </p:grpSp>
-      <p:grpSp>
-        <p:nvGrpSpPr>
           <p:cNvPr id="27" name="Google Shape;572;p27">
             <a:extLst>
               <a:ext uri="{FF2B5EF4-FFF2-40B4-BE49-F238E27FC236}">
@@ -24914,6 +24428,162 @@
           </a:p>
         </p:txBody>
       </p:sp>
+      <p:sp>
+        <p:nvSpPr>
+          <p:cNvPr id="2" name="Правоъгълник 1">
+            <a:extLst>
+              <a:ext uri="{FF2B5EF4-FFF2-40B4-BE49-F238E27FC236}">
+                <a16:creationId xmlns:a16="http://schemas.microsoft.com/office/drawing/2014/main" id="{B58E8D97-DCD6-794C-A3E5-D0156F51426F}"/>
+              </a:ext>
+            </a:extLst>
+          </p:cNvPr>
+          <p:cNvSpPr/>
+          <p:nvPr/>
+        </p:nvSpPr>
+        <p:spPr>
+          <a:xfrm>
+            <a:off x="1804539" y="1512277"/>
+            <a:ext cx="752622" cy="569741"/>
+          </a:xfrm>
+          <a:prstGeom prst="rect">
+            <a:avLst/>
+          </a:prstGeom>
+          <a:solidFill>
+            <a:srgbClr val="F5EEDC"/>
+          </a:solidFill>
+          <a:ln>
+            <a:noFill/>
+          </a:ln>
+        </p:spPr>
+        <p:style>
+          <a:lnRef idx="2">
+            <a:schemeClr val="accent1">
+              <a:shade val="50000"/>
+            </a:schemeClr>
+          </a:lnRef>
+          <a:fillRef idx="1">
+            <a:schemeClr val="accent1"/>
+          </a:fillRef>
+          <a:effectRef idx="0">
+            <a:schemeClr val="accent1"/>
+          </a:effectRef>
+          <a:fontRef idx="minor">
+            <a:schemeClr val="lt1"/>
+          </a:fontRef>
+        </p:style>
+        <p:txBody>
+          <a:bodyPr rtlCol="0" anchor="ctr"/>
+          <a:lstStyle/>
+          <a:p>
+            <a:pPr algn="ctr"/>
+            <a:endParaRPr lang="bg-BG"/>
+          </a:p>
+        </p:txBody>
+      </p:sp>
+      <p:sp>
+        <p:nvSpPr>
+          <p:cNvPr id="3" name="Правоъгълник 2">
+            <a:extLst>
+              <a:ext uri="{FF2B5EF4-FFF2-40B4-BE49-F238E27FC236}">
+                <a16:creationId xmlns:a16="http://schemas.microsoft.com/office/drawing/2014/main" id="{EC219E96-DD51-CF09-0107-14A445A363F5}"/>
+              </a:ext>
+            </a:extLst>
+          </p:cNvPr>
+          <p:cNvSpPr/>
+          <p:nvPr/>
+        </p:nvSpPr>
+        <p:spPr>
+          <a:xfrm>
+            <a:off x="7309695" y="2353309"/>
+            <a:ext cx="752622" cy="569741"/>
+          </a:xfrm>
+          <a:prstGeom prst="rect">
+            <a:avLst/>
+          </a:prstGeom>
+          <a:solidFill>
+            <a:srgbClr val="F5EEDC"/>
+          </a:solidFill>
+          <a:ln>
+            <a:noFill/>
+          </a:ln>
+        </p:spPr>
+        <p:style>
+          <a:lnRef idx="2">
+            <a:schemeClr val="accent1">
+              <a:shade val="50000"/>
+            </a:schemeClr>
+          </a:lnRef>
+          <a:fillRef idx="1">
+            <a:schemeClr val="accent1"/>
+          </a:fillRef>
+          <a:effectRef idx="0">
+            <a:schemeClr val="accent1"/>
+          </a:effectRef>
+          <a:fontRef idx="minor">
+            <a:schemeClr val="lt1"/>
+          </a:fontRef>
+        </p:style>
+        <p:txBody>
+          <a:bodyPr rtlCol="0" anchor="ctr"/>
+          <a:lstStyle/>
+          <a:p>
+            <a:pPr algn="ctr"/>
+            <a:endParaRPr lang="bg-BG"/>
+          </a:p>
+        </p:txBody>
+      </p:sp>
+      <p:sp>
+        <p:nvSpPr>
+          <p:cNvPr id="4" name="Правоъгълник 3">
+            <a:extLst>
+              <a:ext uri="{FF2B5EF4-FFF2-40B4-BE49-F238E27FC236}">
+                <a16:creationId xmlns:a16="http://schemas.microsoft.com/office/drawing/2014/main" id="{24099C1A-3F3F-DF18-F6F7-B2A79411A033}"/>
+              </a:ext>
+            </a:extLst>
+          </p:cNvPr>
+          <p:cNvSpPr/>
+          <p:nvPr/>
+        </p:nvSpPr>
+        <p:spPr>
+          <a:xfrm>
+            <a:off x="7309695" y="2698652"/>
+            <a:ext cx="752622" cy="569741"/>
+          </a:xfrm>
+          <a:prstGeom prst="rect">
+            <a:avLst/>
+          </a:prstGeom>
+          <a:solidFill>
+            <a:srgbClr val="F5EEDC"/>
+          </a:solidFill>
+          <a:ln>
+            <a:noFill/>
+          </a:ln>
+        </p:spPr>
+        <p:style>
+          <a:lnRef idx="2">
+            <a:schemeClr val="accent1">
+              <a:shade val="50000"/>
+            </a:schemeClr>
+          </a:lnRef>
+          <a:fillRef idx="1">
+            <a:schemeClr val="accent1"/>
+          </a:fillRef>
+          <a:effectRef idx="0">
+            <a:schemeClr val="accent1"/>
+          </a:effectRef>
+          <a:fontRef idx="minor">
+            <a:schemeClr val="lt1"/>
+          </a:fontRef>
+        </p:style>
+        <p:txBody>
+          <a:bodyPr rtlCol="0" anchor="ctr"/>
+          <a:lstStyle/>
+          <a:p>
+            <a:pPr algn="ctr"/>
+            <a:endParaRPr lang="bg-BG"/>
+          </a:p>
+        </p:txBody>
+      </p:sp>
     </p:spTree>
   </p:cSld>
   <p:clrMapOvr>
@@ -25713,735 +25383,6 @@
           </a:p>
         </p:txBody>
       </p:sp>
-      <p:grpSp>
-        <p:nvGrpSpPr>
-          <p:cNvPr id="646" name="Google Shape;646;p29"/>
-          <p:cNvGrpSpPr/>
-          <p:nvPr/>
-        </p:nvGrpSpPr>
-        <p:grpSpPr>
-          <a:xfrm>
-            <a:off x="4382331" y="2475774"/>
-            <a:ext cx="476769" cy="470901"/>
-            <a:chOff x="4252781" y="935174"/>
-            <a:chExt cx="476769" cy="470901"/>
-          </a:xfrm>
-        </p:grpSpPr>
-        <p:sp>
-          <p:nvSpPr>
-            <p:cNvPr id="647" name="Google Shape;647;p29"/>
-            <p:cNvSpPr/>
-            <p:nvPr/>
-          </p:nvSpPr>
-          <p:spPr>
-            <a:xfrm>
-              <a:off x="4285025" y="935175"/>
-              <a:ext cx="444525" cy="470900"/>
-            </a:xfrm>
-            <a:custGeom>
-              <a:avLst/>
-              <a:gdLst/>
-              <a:ahLst/>
-              <a:cxnLst/>
-              <a:rect l="l" t="t" r="r" b="b"/>
-              <a:pathLst>
-                <a:path w="17781" h="18836" extrusionOk="0">
-                  <a:moveTo>
-                    <a:pt x="3775" y="0"/>
-                  </a:moveTo>
-                  <a:cubicBezTo>
-                    <a:pt x="3585" y="0"/>
-                    <a:pt x="3394" y="18"/>
-                    <a:pt x="3203" y="55"/>
-                  </a:cubicBezTo>
-                  <a:cubicBezTo>
-                    <a:pt x="1102" y="456"/>
-                    <a:pt x="1" y="2924"/>
-                    <a:pt x="268" y="5059"/>
-                  </a:cubicBezTo>
-                  <a:cubicBezTo>
-                    <a:pt x="568" y="7160"/>
-                    <a:pt x="1802" y="8995"/>
-                    <a:pt x="2870" y="10830"/>
-                  </a:cubicBezTo>
-                  <a:cubicBezTo>
-                    <a:pt x="4304" y="13365"/>
-                    <a:pt x="5472" y="16033"/>
-                    <a:pt x="6339" y="18835"/>
-                  </a:cubicBezTo>
-                  <a:cubicBezTo>
-                    <a:pt x="10108" y="15166"/>
-                    <a:pt x="13444" y="11063"/>
-                    <a:pt x="16213" y="6593"/>
-                  </a:cubicBezTo>
-                  <a:cubicBezTo>
-                    <a:pt x="17013" y="5326"/>
-                    <a:pt x="17780" y="3925"/>
-                    <a:pt x="17614" y="2457"/>
-                  </a:cubicBezTo>
-                  <a:cubicBezTo>
-                    <a:pt x="17614" y="2123"/>
-                    <a:pt x="17513" y="1823"/>
-                    <a:pt x="17313" y="1556"/>
-                  </a:cubicBezTo>
-                  <a:cubicBezTo>
-                    <a:pt x="17061" y="1274"/>
-                    <a:pt x="16715" y="1164"/>
-                    <a:pt x="16342" y="1164"/>
-                  </a:cubicBezTo>
-                  <a:cubicBezTo>
-                    <a:pt x="15878" y="1164"/>
-                    <a:pt x="15370" y="1334"/>
-                    <a:pt x="14945" y="1556"/>
-                  </a:cubicBezTo>
-                  <a:cubicBezTo>
-                    <a:pt x="12543" y="2824"/>
-                    <a:pt x="10842" y="5059"/>
-                    <a:pt x="9174" y="7160"/>
-                  </a:cubicBezTo>
-                  <a:cubicBezTo>
-                    <a:pt x="8741" y="5426"/>
-                    <a:pt x="8207" y="3424"/>
-                    <a:pt x="7173" y="1957"/>
-                  </a:cubicBezTo>
-                  <a:cubicBezTo>
-                    <a:pt x="6384" y="876"/>
-                    <a:pt x="5110" y="0"/>
-                    <a:pt x="3775" y="0"/>
-                  </a:cubicBezTo>
-                  <a:close/>
-                </a:path>
-              </a:pathLst>
-            </a:custGeom>
-            <a:solidFill>
-              <a:schemeClr val="accent5"/>
-            </a:solidFill>
-            <a:ln>
-              <a:noFill/>
-            </a:ln>
-          </p:spPr>
-          <p:txBody>
-            <a:bodyPr spcFirstLastPara="1" wrap="square" lIns="91425" tIns="91425" rIns="91425" bIns="91425" anchor="ctr" anchorCtr="0">
-              <a:noAutofit/>
-            </a:bodyPr>
-            <a:lstStyle/>
-            <a:p>
-              <a:pPr marL="0" lvl="0" indent="0" algn="l" rtl="0">
-                <a:spcBef>
-                  <a:spcPts val="0"/>
-                </a:spcBef>
-                <a:spcAft>
-                  <a:spcPts val="0"/>
-                </a:spcAft>
-                <a:buNone/>
-              </a:pPr>
-              <a:endParaRPr/>
-            </a:p>
-          </p:txBody>
-        </p:sp>
-        <p:sp>
-          <p:nvSpPr>
-            <p:cNvPr id="648" name="Google Shape;648;p29"/>
-            <p:cNvSpPr/>
-            <p:nvPr/>
-          </p:nvSpPr>
-          <p:spPr>
-            <a:xfrm>
-              <a:off x="4252781" y="935174"/>
-              <a:ext cx="444525" cy="470900"/>
-            </a:xfrm>
-            <a:custGeom>
-              <a:avLst/>
-              <a:gdLst/>
-              <a:ahLst/>
-              <a:cxnLst/>
-              <a:rect l="l" t="t" r="r" b="b"/>
-              <a:pathLst>
-                <a:path w="17781" h="18836" extrusionOk="0">
-                  <a:moveTo>
-                    <a:pt x="3775" y="0"/>
-                  </a:moveTo>
-                  <a:cubicBezTo>
-                    <a:pt x="3585" y="0"/>
-                    <a:pt x="3394" y="18"/>
-                    <a:pt x="3203" y="55"/>
-                  </a:cubicBezTo>
-                  <a:cubicBezTo>
-                    <a:pt x="1102" y="456"/>
-                    <a:pt x="1" y="2924"/>
-                    <a:pt x="268" y="5059"/>
-                  </a:cubicBezTo>
-                  <a:cubicBezTo>
-                    <a:pt x="568" y="7160"/>
-                    <a:pt x="1802" y="8995"/>
-                    <a:pt x="2870" y="10830"/>
-                  </a:cubicBezTo>
-                  <a:cubicBezTo>
-                    <a:pt x="4304" y="13365"/>
-                    <a:pt x="5472" y="16033"/>
-                    <a:pt x="6339" y="18835"/>
-                  </a:cubicBezTo>
-                  <a:cubicBezTo>
-                    <a:pt x="10108" y="15166"/>
-                    <a:pt x="13444" y="11063"/>
-                    <a:pt x="16213" y="6593"/>
-                  </a:cubicBezTo>
-                  <a:cubicBezTo>
-                    <a:pt x="17013" y="5326"/>
-                    <a:pt x="17780" y="3925"/>
-                    <a:pt x="17614" y="2457"/>
-                  </a:cubicBezTo>
-                  <a:cubicBezTo>
-                    <a:pt x="17614" y="2123"/>
-                    <a:pt x="17513" y="1823"/>
-                    <a:pt x="17313" y="1556"/>
-                  </a:cubicBezTo>
-                  <a:cubicBezTo>
-                    <a:pt x="17061" y="1274"/>
-                    <a:pt x="16715" y="1164"/>
-                    <a:pt x="16342" y="1164"/>
-                  </a:cubicBezTo>
-                  <a:cubicBezTo>
-                    <a:pt x="15878" y="1164"/>
-                    <a:pt x="15370" y="1334"/>
-                    <a:pt x="14945" y="1556"/>
-                  </a:cubicBezTo>
-                  <a:cubicBezTo>
-                    <a:pt x="12543" y="2824"/>
-                    <a:pt x="10842" y="5059"/>
-                    <a:pt x="9174" y="7160"/>
-                  </a:cubicBezTo>
-                  <a:cubicBezTo>
-                    <a:pt x="8741" y="5426"/>
-                    <a:pt x="8207" y="3424"/>
-                    <a:pt x="7173" y="1957"/>
-                  </a:cubicBezTo>
-                  <a:cubicBezTo>
-                    <a:pt x="6384" y="876"/>
-                    <a:pt x="5110" y="0"/>
-                    <a:pt x="3775" y="0"/>
-                  </a:cubicBezTo>
-                  <a:close/>
-                </a:path>
-              </a:pathLst>
-            </a:custGeom>
-            <a:noFill/>
-            <a:ln w="19050" cap="flat" cmpd="sng">
-              <a:solidFill>
-                <a:schemeClr val="dk2"/>
-              </a:solidFill>
-              <a:prstDash val="solid"/>
-              <a:round/>
-              <a:headEnd type="none" w="sm" len="sm"/>
-              <a:tailEnd type="none" w="sm" len="sm"/>
-            </a:ln>
-          </p:spPr>
-          <p:txBody>
-            <a:bodyPr spcFirstLastPara="1" wrap="square" lIns="91425" tIns="91425" rIns="91425" bIns="91425" anchor="ctr" anchorCtr="0">
-              <a:noAutofit/>
-            </a:bodyPr>
-            <a:lstStyle/>
-            <a:p>
-              <a:pPr marL="0" lvl="0" indent="0" algn="l" rtl="0">
-                <a:spcBef>
-                  <a:spcPts val="0"/>
-                </a:spcBef>
-                <a:spcAft>
-                  <a:spcPts val="0"/>
-                </a:spcAft>
-                <a:buNone/>
-              </a:pPr>
-              <a:endParaRPr/>
-            </a:p>
-          </p:txBody>
-        </p:sp>
-      </p:grpSp>
-      <p:grpSp>
-        <p:nvGrpSpPr>
-          <p:cNvPr id="649" name="Google Shape;649;p29"/>
-          <p:cNvGrpSpPr/>
-          <p:nvPr/>
-        </p:nvGrpSpPr>
-        <p:grpSpPr>
-          <a:xfrm>
-            <a:off x="4433325" y="3287525"/>
-            <a:ext cx="374779" cy="350950"/>
-            <a:chOff x="4826800" y="1400925"/>
-            <a:chExt cx="374779" cy="350950"/>
-          </a:xfrm>
-        </p:grpSpPr>
-        <p:sp>
-          <p:nvSpPr>
-            <p:cNvPr id="650" name="Google Shape;650;p29"/>
-            <p:cNvSpPr/>
-            <p:nvPr/>
-          </p:nvSpPr>
-          <p:spPr>
-            <a:xfrm>
-              <a:off x="4826800" y="1400925"/>
-              <a:ext cx="346950" cy="350950"/>
-            </a:xfrm>
-            <a:custGeom>
-              <a:avLst/>
-              <a:gdLst/>
-              <a:ahLst/>
-              <a:cxnLst/>
-              <a:rect l="l" t="t" r="r" b="b"/>
-              <a:pathLst>
-                <a:path w="13878" h="14038" extrusionOk="0">
-                  <a:moveTo>
-                    <a:pt x="11774" y="1"/>
-                  </a:moveTo>
-                  <a:cubicBezTo>
-                    <a:pt x="10765" y="1"/>
-                    <a:pt x="9884" y="878"/>
-                    <a:pt x="9308" y="1728"/>
-                  </a:cubicBezTo>
-                  <a:cubicBezTo>
-                    <a:pt x="8674" y="2662"/>
-                    <a:pt x="8307" y="3696"/>
-                    <a:pt x="7773" y="4630"/>
-                  </a:cubicBezTo>
-                  <a:cubicBezTo>
-                    <a:pt x="7139" y="3463"/>
-                    <a:pt x="6239" y="2429"/>
-                    <a:pt x="5105" y="1695"/>
-                  </a:cubicBezTo>
-                  <a:cubicBezTo>
-                    <a:pt x="4556" y="1306"/>
-                    <a:pt x="3914" y="1113"/>
-                    <a:pt x="3267" y="1113"/>
-                  </a:cubicBezTo>
-                  <a:cubicBezTo>
-                    <a:pt x="2695" y="1113"/>
-                    <a:pt x="2119" y="1264"/>
-                    <a:pt x="1602" y="1562"/>
-                  </a:cubicBezTo>
-                  <a:cubicBezTo>
-                    <a:pt x="134" y="2496"/>
-                    <a:pt x="1" y="4730"/>
-                    <a:pt x="768" y="6298"/>
-                  </a:cubicBezTo>
-                  <a:cubicBezTo>
-                    <a:pt x="1569" y="7866"/>
-                    <a:pt x="3003" y="8967"/>
-                    <a:pt x="4337" y="10134"/>
-                  </a:cubicBezTo>
-                  <a:cubicBezTo>
-                    <a:pt x="5738" y="11335"/>
-                    <a:pt x="7073" y="12636"/>
-                    <a:pt x="8307" y="14037"/>
-                  </a:cubicBezTo>
-                  <a:cubicBezTo>
-                    <a:pt x="10475" y="11268"/>
-                    <a:pt x="12176" y="8166"/>
-                    <a:pt x="13344" y="4864"/>
-                  </a:cubicBezTo>
-                  <a:cubicBezTo>
-                    <a:pt x="13744" y="3997"/>
-                    <a:pt x="13878" y="3029"/>
-                    <a:pt x="13811" y="2062"/>
-                  </a:cubicBezTo>
-                  <a:cubicBezTo>
-                    <a:pt x="13677" y="1128"/>
-                    <a:pt x="13044" y="194"/>
-                    <a:pt x="12076" y="27"/>
-                  </a:cubicBezTo>
-                  <a:cubicBezTo>
-                    <a:pt x="11974" y="9"/>
-                    <a:pt x="11873" y="1"/>
-                    <a:pt x="11774" y="1"/>
-                  </a:cubicBezTo>
-                  <a:close/>
-                </a:path>
-              </a:pathLst>
-            </a:custGeom>
-            <a:solidFill>
-              <a:schemeClr val="accent5"/>
-            </a:solidFill>
-            <a:ln>
-              <a:noFill/>
-            </a:ln>
-          </p:spPr>
-          <p:txBody>
-            <a:bodyPr spcFirstLastPara="1" wrap="square" lIns="91425" tIns="91425" rIns="91425" bIns="91425" anchor="ctr" anchorCtr="0">
-              <a:noAutofit/>
-            </a:bodyPr>
-            <a:lstStyle/>
-            <a:p>
-              <a:pPr marL="0" lvl="0" indent="0" algn="l" rtl="0">
-                <a:spcBef>
-                  <a:spcPts val="0"/>
-                </a:spcBef>
-                <a:spcAft>
-                  <a:spcPts val="0"/>
-                </a:spcAft>
-                <a:buNone/>
-              </a:pPr>
-              <a:endParaRPr/>
-            </a:p>
-          </p:txBody>
-        </p:sp>
-        <p:sp>
-          <p:nvSpPr>
-            <p:cNvPr id="651" name="Google Shape;651;p29"/>
-            <p:cNvSpPr/>
-            <p:nvPr/>
-          </p:nvSpPr>
-          <p:spPr>
-            <a:xfrm>
-              <a:off x="4854629" y="1400925"/>
-              <a:ext cx="346950" cy="350950"/>
-            </a:xfrm>
-            <a:custGeom>
-              <a:avLst/>
-              <a:gdLst/>
-              <a:ahLst/>
-              <a:cxnLst/>
-              <a:rect l="l" t="t" r="r" b="b"/>
-              <a:pathLst>
-                <a:path w="13878" h="14038" extrusionOk="0">
-                  <a:moveTo>
-                    <a:pt x="11774" y="1"/>
-                  </a:moveTo>
-                  <a:cubicBezTo>
-                    <a:pt x="10765" y="1"/>
-                    <a:pt x="9884" y="878"/>
-                    <a:pt x="9308" y="1728"/>
-                  </a:cubicBezTo>
-                  <a:cubicBezTo>
-                    <a:pt x="8674" y="2662"/>
-                    <a:pt x="8307" y="3696"/>
-                    <a:pt x="7773" y="4630"/>
-                  </a:cubicBezTo>
-                  <a:cubicBezTo>
-                    <a:pt x="7139" y="3463"/>
-                    <a:pt x="6239" y="2429"/>
-                    <a:pt x="5105" y="1695"/>
-                  </a:cubicBezTo>
-                  <a:cubicBezTo>
-                    <a:pt x="4556" y="1306"/>
-                    <a:pt x="3914" y="1113"/>
-                    <a:pt x="3267" y="1113"/>
-                  </a:cubicBezTo>
-                  <a:cubicBezTo>
-                    <a:pt x="2695" y="1113"/>
-                    <a:pt x="2119" y="1264"/>
-                    <a:pt x="1602" y="1562"/>
-                  </a:cubicBezTo>
-                  <a:cubicBezTo>
-                    <a:pt x="134" y="2496"/>
-                    <a:pt x="1" y="4730"/>
-                    <a:pt x="768" y="6298"/>
-                  </a:cubicBezTo>
-                  <a:cubicBezTo>
-                    <a:pt x="1569" y="7866"/>
-                    <a:pt x="3003" y="8967"/>
-                    <a:pt x="4337" y="10134"/>
-                  </a:cubicBezTo>
-                  <a:cubicBezTo>
-                    <a:pt x="5738" y="11335"/>
-                    <a:pt x="7073" y="12636"/>
-                    <a:pt x="8307" y="14037"/>
-                  </a:cubicBezTo>
-                  <a:cubicBezTo>
-                    <a:pt x="10475" y="11268"/>
-                    <a:pt x="12176" y="8166"/>
-                    <a:pt x="13344" y="4864"/>
-                  </a:cubicBezTo>
-                  <a:cubicBezTo>
-                    <a:pt x="13744" y="3997"/>
-                    <a:pt x="13878" y="3029"/>
-                    <a:pt x="13811" y="2062"/>
-                  </a:cubicBezTo>
-                  <a:cubicBezTo>
-                    <a:pt x="13677" y="1128"/>
-                    <a:pt x="13044" y="194"/>
-                    <a:pt x="12076" y="27"/>
-                  </a:cubicBezTo>
-                  <a:cubicBezTo>
-                    <a:pt x="11974" y="9"/>
-                    <a:pt x="11873" y="1"/>
-                    <a:pt x="11774" y="1"/>
-                  </a:cubicBezTo>
-                  <a:close/>
-                </a:path>
-              </a:pathLst>
-            </a:custGeom>
-            <a:noFill/>
-            <a:ln w="19050" cap="flat" cmpd="sng">
-              <a:solidFill>
-                <a:schemeClr val="dk2"/>
-              </a:solidFill>
-              <a:prstDash val="solid"/>
-              <a:round/>
-              <a:headEnd type="none" w="sm" len="sm"/>
-              <a:tailEnd type="none" w="sm" len="sm"/>
-            </a:ln>
-          </p:spPr>
-          <p:txBody>
-            <a:bodyPr spcFirstLastPara="1" wrap="square" lIns="91425" tIns="91425" rIns="91425" bIns="91425" anchor="ctr" anchorCtr="0">
-              <a:noAutofit/>
-            </a:bodyPr>
-            <a:lstStyle/>
-            <a:p>
-              <a:pPr marL="0" lvl="0" indent="0" algn="l" rtl="0">
-                <a:spcBef>
-                  <a:spcPts val="0"/>
-                </a:spcBef>
-                <a:spcAft>
-                  <a:spcPts val="0"/>
-                </a:spcAft>
-                <a:buNone/>
-              </a:pPr>
-              <a:endParaRPr/>
-            </a:p>
-          </p:txBody>
-        </p:sp>
-      </p:grpSp>
-      <p:grpSp>
-        <p:nvGrpSpPr>
-          <p:cNvPr id="652" name="Google Shape;652;p29"/>
-          <p:cNvGrpSpPr/>
-          <p:nvPr/>
-        </p:nvGrpSpPr>
-        <p:grpSpPr>
-          <a:xfrm>
-            <a:off x="4530511" y="1783950"/>
-            <a:ext cx="379976" cy="350963"/>
-            <a:chOff x="5162486" y="3741525"/>
-            <a:chExt cx="379976" cy="350963"/>
-          </a:xfrm>
-        </p:grpSpPr>
-        <p:sp>
-          <p:nvSpPr>
-            <p:cNvPr id="653" name="Google Shape;653;p29"/>
-            <p:cNvSpPr/>
-            <p:nvPr/>
-          </p:nvSpPr>
-          <p:spPr>
-            <a:xfrm flipH="1">
-              <a:off x="5195513" y="3741538"/>
-              <a:ext cx="346950" cy="350950"/>
-            </a:xfrm>
-            <a:custGeom>
-              <a:avLst/>
-              <a:gdLst/>
-              <a:ahLst/>
-              <a:cxnLst/>
-              <a:rect l="l" t="t" r="r" b="b"/>
-              <a:pathLst>
-                <a:path w="13878" h="14038" extrusionOk="0">
-                  <a:moveTo>
-                    <a:pt x="11774" y="1"/>
-                  </a:moveTo>
-                  <a:cubicBezTo>
-                    <a:pt x="10765" y="1"/>
-                    <a:pt x="9884" y="878"/>
-                    <a:pt x="9308" y="1728"/>
-                  </a:cubicBezTo>
-                  <a:cubicBezTo>
-                    <a:pt x="8674" y="2662"/>
-                    <a:pt x="8307" y="3696"/>
-                    <a:pt x="7773" y="4630"/>
-                  </a:cubicBezTo>
-                  <a:cubicBezTo>
-                    <a:pt x="7139" y="3463"/>
-                    <a:pt x="6239" y="2429"/>
-                    <a:pt x="5105" y="1695"/>
-                  </a:cubicBezTo>
-                  <a:cubicBezTo>
-                    <a:pt x="4556" y="1306"/>
-                    <a:pt x="3914" y="1113"/>
-                    <a:pt x="3267" y="1113"/>
-                  </a:cubicBezTo>
-                  <a:cubicBezTo>
-                    <a:pt x="2695" y="1113"/>
-                    <a:pt x="2119" y="1264"/>
-                    <a:pt x="1602" y="1562"/>
-                  </a:cubicBezTo>
-                  <a:cubicBezTo>
-                    <a:pt x="134" y="2496"/>
-                    <a:pt x="1" y="4730"/>
-                    <a:pt x="768" y="6298"/>
-                  </a:cubicBezTo>
-                  <a:cubicBezTo>
-                    <a:pt x="1569" y="7866"/>
-                    <a:pt x="3003" y="8967"/>
-                    <a:pt x="4337" y="10134"/>
-                  </a:cubicBezTo>
-                  <a:cubicBezTo>
-                    <a:pt x="5738" y="11335"/>
-                    <a:pt x="7073" y="12636"/>
-                    <a:pt x="8307" y="14037"/>
-                  </a:cubicBezTo>
-                  <a:cubicBezTo>
-                    <a:pt x="10475" y="11268"/>
-                    <a:pt x="12176" y="8166"/>
-                    <a:pt x="13344" y="4864"/>
-                  </a:cubicBezTo>
-                  <a:cubicBezTo>
-                    <a:pt x="13744" y="3997"/>
-                    <a:pt x="13878" y="3029"/>
-                    <a:pt x="13811" y="2062"/>
-                  </a:cubicBezTo>
-                  <a:cubicBezTo>
-                    <a:pt x="13677" y="1128"/>
-                    <a:pt x="13044" y="194"/>
-                    <a:pt x="12076" y="27"/>
-                  </a:cubicBezTo>
-                  <a:cubicBezTo>
-                    <a:pt x="11974" y="9"/>
-                    <a:pt x="11873" y="1"/>
-                    <a:pt x="11774" y="1"/>
-                  </a:cubicBezTo>
-                  <a:close/>
-                </a:path>
-              </a:pathLst>
-            </a:custGeom>
-            <a:solidFill>
-              <a:schemeClr val="accent5"/>
-            </a:solidFill>
-            <a:ln>
-              <a:noFill/>
-            </a:ln>
-          </p:spPr>
-          <p:txBody>
-            <a:bodyPr spcFirstLastPara="1" wrap="square" lIns="91425" tIns="91425" rIns="91425" bIns="91425" anchor="ctr" anchorCtr="0">
-              <a:noAutofit/>
-            </a:bodyPr>
-            <a:lstStyle/>
-            <a:p>
-              <a:pPr marL="0" lvl="0" indent="0" algn="l" rtl="0">
-                <a:spcBef>
-                  <a:spcPts val="0"/>
-                </a:spcBef>
-                <a:spcAft>
-                  <a:spcPts val="0"/>
-                </a:spcAft>
-                <a:buNone/>
-              </a:pPr>
-              <a:endParaRPr/>
-            </a:p>
-          </p:txBody>
-        </p:sp>
-        <p:sp>
-          <p:nvSpPr>
-            <p:cNvPr id="654" name="Google Shape;654;p29"/>
-            <p:cNvSpPr/>
-            <p:nvPr/>
-          </p:nvSpPr>
-          <p:spPr>
-            <a:xfrm flipH="1">
-              <a:off x="5162486" y="3741525"/>
-              <a:ext cx="346950" cy="350950"/>
-            </a:xfrm>
-            <a:custGeom>
-              <a:avLst/>
-              <a:gdLst/>
-              <a:ahLst/>
-              <a:cxnLst/>
-              <a:rect l="l" t="t" r="r" b="b"/>
-              <a:pathLst>
-                <a:path w="13878" h="14038" extrusionOk="0">
-                  <a:moveTo>
-                    <a:pt x="11774" y="1"/>
-                  </a:moveTo>
-                  <a:cubicBezTo>
-                    <a:pt x="10765" y="1"/>
-                    <a:pt x="9884" y="878"/>
-                    <a:pt x="9308" y="1728"/>
-                  </a:cubicBezTo>
-                  <a:cubicBezTo>
-                    <a:pt x="8674" y="2662"/>
-                    <a:pt x="8307" y="3696"/>
-                    <a:pt x="7773" y="4630"/>
-                  </a:cubicBezTo>
-                  <a:cubicBezTo>
-                    <a:pt x="7139" y="3463"/>
-                    <a:pt x="6239" y="2429"/>
-                    <a:pt x="5105" y="1695"/>
-                  </a:cubicBezTo>
-                  <a:cubicBezTo>
-                    <a:pt x="4556" y="1306"/>
-                    <a:pt x="3914" y="1113"/>
-                    <a:pt x="3267" y="1113"/>
-                  </a:cubicBezTo>
-                  <a:cubicBezTo>
-                    <a:pt x="2695" y="1113"/>
-                    <a:pt x="2119" y="1264"/>
-                    <a:pt x="1602" y="1562"/>
-                  </a:cubicBezTo>
-                  <a:cubicBezTo>
-                    <a:pt x="134" y="2496"/>
-                    <a:pt x="1" y="4730"/>
-                    <a:pt x="768" y="6298"/>
-                  </a:cubicBezTo>
-                  <a:cubicBezTo>
-                    <a:pt x="1569" y="7866"/>
-                    <a:pt x="3003" y="8967"/>
-                    <a:pt x="4337" y="10134"/>
-                  </a:cubicBezTo>
-                  <a:cubicBezTo>
-                    <a:pt x="5738" y="11335"/>
-                    <a:pt x="7073" y="12636"/>
-                    <a:pt x="8307" y="14037"/>
-                  </a:cubicBezTo>
-                  <a:cubicBezTo>
-                    <a:pt x="10475" y="11268"/>
-                    <a:pt x="12176" y="8166"/>
-                    <a:pt x="13344" y="4864"/>
-                  </a:cubicBezTo>
-                  <a:cubicBezTo>
-                    <a:pt x="13744" y="3997"/>
-                    <a:pt x="13878" y="3029"/>
-                    <a:pt x="13811" y="2062"/>
-                  </a:cubicBezTo>
-                  <a:cubicBezTo>
-                    <a:pt x="13677" y="1128"/>
-                    <a:pt x="13044" y="194"/>
-                    <a:pt x="12076" y="27"/>
-                  </a:cubicBezTo>
-                  <a:cubicBezTo>
-                    <a:pt x="11974" y="9"/>
-                    <a:pt x="11873" y="1"/>
-                    <a:pt x="11774" y="1"/>
-                  </a:cubicBezTo>
-                  <a:close/>
-                </a:path>
-              </a:pathLst>
-            </a:custGeom>
-            <a:noFill/>
-            <a:ln w="19050" cap="flat" cmpd="sng">
-              <a:solidFill>
-                <a:schemeClr val="dk2"/>
-              </a:solidFill>
-              <a:prstDash val="solid"/>
-              <a:round/>
-              <a:headEnd type="none" w="sm" len="sm"/>
-              <a:tailEnd type="none" w="sm" len="sm"/>
-            </a:ln>
-          </p:spPr>
-          <p:txBody>
-            <a:bodyPr spcFirstLastPara="1" wrap="square" lIns="91425" tIns="91425" rIns="91425" bIns="91425" anchor="ctr" anchorCtr="0">
-              <a:noAutofit/>
-            </a:bodyPr>
-            <a:lstStyle/>
-            <a:p>
-              <a:pPr marL="0" lvl="0" indent="0" algn="l" rtl="0">
-                <a:spcBef>
-                  <a:spcPts val="0"/>
-                </a:spcBef>
-                <a:spcAft>
-                  <a:spcPts val="0"/>
-                </a:spcAft>
-                <a:buNone/>
-              </a:pPr>
-              <a:endParaRPr/>
-            </a:p>
-          </p:txBody>
-        </p:sp>
-      </p:grpSp>
     </p:spTree>
   </p:cSld>
   <p:clrMapOvr>
@@ -31247,267 +30188,6 @@
             </a:solidFill>
             <a:ln>
               <a:noFill/>
-            </a:ln>
-          </p:spPr>
-          <p:txBody>
-            <a:bodyPr spcFirstLastPara="1" wrap="square" lIns="91425" tIns="91425" rIns="91425" bIns="91425" anchor="ctr" anchorCtr="0">
-              <a:noAutofit/>
-            </a:bodyPr>
-            <a:lstStyle/>
-            <a:p>
-              <a:pPr marL="0" lvl="0" indent="0" algn="l" rtl="0">
-                <a:spcBef>
-                  <a:spcPts val="0"/>
-                </a:spcBef>
-                <a:spcAft>
-                  <a:spcPts val="0"/>
-                </a:spcAft>
-                <a:buNone/>
-              </a:pPr>
-              <a:endParaRPr/>
-            </a:p>
-          </p:txBody>
-        </p:sp>
-      </p:grpSp>
-      <p:grpSp>
-        <p:nvGrpSpPr>
-          <p:cNvPr id="50" name="Google Shape;646;p29">
-            <a:extLst>
-              <a:ext uri="{FF2B5EF4-FFF2-40B4-BE49-F238E27FC236}">
-                <a16:creationId xmlns:a16="http://schemas.microsoft.com/office/drawing/2014/main" id="{BBF0F18D-F2FF-18F1-F898-E9F1743CF65B}"/>
-              </a:ext>
-            </a:extLst>
-          </p:cNvPr>
-          <p:cNvGrpSpPr/>
-          <p:nvPr/>
-        </p:nvGrpSpPr>
-        <p:grpSpPr>
-          <a:xfrm>
-            <a:off x="822716" y="3257193"/>
-            <a:ext cx="457942" cy="378699"/>
-            <a:chOff x="4252781" y="935174"/>
-            <a:chExt cx="476767" cy="470902"/>
-          </a:xfrm>
-        </p:grpSpPr>
-        <p:sp>
-          <p:nvSpPr>
-            <p:cNvPr id="51" name="Google Shape;647;p29">
-              <a:extLst>
-                <a:ext uri="{FF2B5EF4-FFF2-40B4-BE49-F238E27FC236}">
-                  <a16:creationId xmlns:a16="http://schemas.microsoft.com/office/drawing/2014/main" id="{892EC06D-3052-C13F-C323-471A101DE93F}"/>
-                </a:ext>
-              </a:extLst>
-            </p:cNvPr>
-            <p:cNvSpPr/>
-            <p:nvPr/>
-          </p:nvSpPr>
-          <p:spPr>
-            <a:xfrm>
-              <a:off x="4285024" y="935176"/>
-              <a:ext cx="444524" cy="470900"/>
-            </a:xfrm>
-            <a:custGeom>
-              <a:avLst/>
-              <a:gdLst/>
-              <a:ahLst/>
-              <a:cxnLst/>
-              <a:rect l="l" t="t" r="r" b="b"/>
-              <a:pathLst>
-                <a:path w="17781" h="18836" extrusionOk="0">
-                  <a:moveTo>
-                    <a:pt x="3775" y="0"/>
-                  </a:moveTo>
-                  <a:cubicBezTo>
-                    <a:pt x="3585" y="0"/>
-                    <a:pt x="3394" y="18"/>
-                    <a:pt x="3203" y="55"/>
-                  </a:cubicBezTo>
-                  <a:cubicBezTo>
-                    <a:pt x="1102" y="456"/>
-                    <a:pt x="1" y="2924"/>
-                    <a:pt x="268" y="5059"/>
-                  </a:cubicBezTo>
-                  <a:cubicBezTo>
-                    <a:pt x="568" y="7160"/>
-                    <a:pt x="1802" y="8995"/>
-                    <a:pt x="2870" y="10830"/>
-                  </a:cubicBezTo>
-                  <a:cubicBezTo>
-                    <a:pt x="4304" y="13365"/>
-                    <a:pt x="5472" y="16033"/>
-                    <a:pt x="6339" y="18835"/>
-                  </a:cubicBezTo>
-                  <a:cubicBezTo>
-                    <a:pt x="10108" y="15166"/>
-                    <a:pt x="13444" y="11063"/>
-                    <a:pt x="16213" y="6593"/>
-                  </a:cubicBezTo>
-                  <a:cubicBezTo>
-                    <a:pt x="17013" y="5326"/>
-                    <a:pt x="17780" y="3925"/>
-                    <a:pt x="17614" y="2457"/>
-                  </a:cubicBezTo>
-                  <a:cubicBezTo>
-                    <a:pt x="17614" y="2123"/>
-                    <a:pt x="17513" y="1823"/>
-                    <a:pt x="17313" y="1556"/>
-                  </a:cubicBezTo>
-                  <a:cubicBezTo>
-                    <a:pt x="17061" y="1274"/>
-                    <a:pt x="16715" y="1164"/>
-                    <a:pt x="16342" y="1164"/>
-                  </a:cubicBezTo>
-                  <a:cubicBezTo>
-                    <a:pt x="15878" y="1164"/>
-                    <a:pt x="15370" y="1334"/>
-                    <a:pt x="14945" y="1556"/>
-                  </a:cubicBezTo>
-                  <a:cubicBezTo>
-                    <a:pt x="12543" y="2824"/>
-                    <a:pt x="10842" y="5059"/>
-                    <a:pt x="9174" y="7160"/>
-                  </a:cubicBezTo>
-                  <a:cubicBezTo>
-                    <a:pt x="8741" y="5426"/>
-                    <a:pt x="8207" y="3424"/>
-                    <a:pt x="7173" y="1957"/>
-                  </a:cubicBezTo>
-                  <a:cubicBezTo>
-                    <a:pt x="6384" y="876"/>
-                    <a:pt x="5110" y="0"/>
-                    <a:pt x="3775" y="0"/>
-                  </a:cubicBezTo>
-                  <a:close/>
-                </a:path>
-              </a:pathLst>
-            </a:custGeom>
-            <a:solidFill>
-              <a:schemeClr val="accent5"/>
-            </a:solidFill>
-            <a:ln>
-              <a:noFill/>
-            </a:ln>
-          </p:spPr>
-          <p:txBody>
-            <a:bodyPr spcFirstLastPara="1" wrap="square" lIns="91425" tIns="91425" rIns="91425" bIns="91425" anchor="ctr" anchorCtr="0">
-              <a:noAutofit/>
-            </a:bodyPr>
-            <a:lstStyle/>
-            <a:p>
-              <a:pPr marL="0" lvl="0" indent="0" algn="l" rtl="0">
-                <a:spcBef>
-                  <a:spcPts val="0"/>
-                </a:spcBef>
-                <a:spcAft>
-                  <a:spcPts val="0"/>
-                </a:spcAft>
-                <a:buNone/>
-              </a:pPr>
-              <a:endParaRPr/>
-            </a:p>
-          </p:txBody>
-        </p:sp>
-        <p:sp>
-          <p:nvSpPr>
-            <p:cNvPr id="52" name="Google Shape;648;p29">
-              <a:extLst>
-                <a:ext uri="{FF2B5EF4-FFF2-40B4-BE49-F238E27FC236}">
-                  <a16:creationId xmlns:a16="http://schemas.microsoft.com/office/drawing/2014/main" id="{7C4B211D-C806-574D-59BE-7FE26C1CE799}"/>
-                </a:ext>
-              </a:extLst>
-            </p:cNvPr>
-            <p:cNvSpPr/>
-            <p:nvPr/>
-          </p:nvSpPr>
-          <p:spPr>
-            <a:xfrm>
-              <a:off x="4252781" y="935174"/>
-              <a:ext cx="444525" cy="470900"/>
-            </a:xfrm>
-            <a:custGeom>
-              <a:avLst/>
-              <a:gdLst/>
-              <a:ahLst/>
-              <a:cxnLst/>
-              <a:rect l="l" t="t" r="r" b="b"/>
-              <a:pathLst>
-                <a:path w="17781" h="18836" extrusionOk="0">
-                  <a:moveTo>
-                    <a:pt x="3775" y="0"/>
-                  </a:moveTo>
-                  <a:cubicBezTo>
-                    <a:pt x="3585" y="0"/>
-                    <a:pt x="3394" y="18"/>
-                    <a:pt x="3203" y="55"/>
-                  </a:cubicBezTo>
-                  <a:cubicBezTo>
-                    <a:pt x="1102" y="456"/>
-                    <a:pt x="1" y="2924"/>
-                    <a:pt x="268" y="5059"/>
-                  </a:cubicBezTo>
-                  <a:cubicBezTo>
-                    <a:pt x="568" y="7160"/>
-                    <a:pt x="1802" y="8995"/>
-                    <a:pt x="2870" y="10830"/>
-                  </a:cubicBezTo>
-                  <a:cubicBezTo>
-                    <a:pt x="4304" y="13365"/>
-                    <a:pt x="5472" y="16033"/>
-                    <a:pt x="6339" y="18835"/>
-                  </a:cubicBezTo>
-                  <a:cubicBezTo>
-                    <a:pt x="10108" y="15166"/>
-                    <a:pt x="13444" y="11063"/>
-                    <a:pt x="16213" y="6593"/>
-                  </a:cubicBezTo>
-                  <a:cubicBezTo>
-                    <a:pt x="17013" y="5326"/>
-                    <a:pt x="17780" y="3925"/>
-                    <a:pt x="17614" y="2457"/>
-                  </a:cubicBezTo>
-                  <a:cubicBezTo>
-                    <a:pt x="17614" y="2123"/>
-                    <a:pt x="17513" y="1823"/>
-                    <a:pt x="17313" y="1556"/>
-                  </a:cubicBezTo>
-                  <a:cubicBezTo>
-                    <a:pt x="17061" y="1274"/>
-                    <a:pt x="16715" y="1164"/>
-                    <a:pt x="16342" y="1164"/>
-                  </a:cubicBezTo>
-                  <a:cubicBezTo>
-                    <a:pt x="15878" y="1164"/>
-                    <a:pt x="15370" y="1334"/>
-                    <a:pt x="14945" y="1556"/>
-                  </a:cubicBezTo>
-                  <a:cubicBezTo>
-                    <a:pt x="12543" y="2824"/>
-                    <a:pt x="10842" y="5059"/>
-                    <a:pt x="9174" y="7160"/>
-                  </a:cubicBezTo>
-                  <a:cubicBezTo>
-                    <a:pt x="8741" y="5426"/>
-                    <a:pt x="8207" y="3424"/>
-                    <a:pt x="7173" y="1957"/>
-                  </a:cubicBezTo>
-                  <a:cubicBezTo>
-                    <a:pt x="6384" y="876"/>
-                    <a:pt x="5110" y="0"/>
-                    <a:pt x="3775" y="0"/>
-                  </a:cubicBezTo>
-                  <a:close/>
-                </a:path>
-              </a:pathLst>
-            </a:custGeom>
-            <a:noFill/>
-            <a:ln w="19050" cap="flat" cmpd="sng">
-              <a:solidFill>
-                <a:schemeClr val="dk2"/>
-              </a:solidFill>
-              <a:prstDash val="solid"/>
-              <a:round/>
-              <a:headEnd type="none" w="sm" len="sm"/>
-              <a:tailEnd type="none" w="sm" len="sm"/>
             </a:ln>
           </p:spPr>
           <p:txBody>
@@ -33337,267 +32017,6 @@
           </p:sp>
         </p:grpSp>
       </p:grpSp>
-      <p:grpSp>
-        <p:nvGrpSpPr>
-          <p:cNvPr id="22" name="Google Shape;774;p34">
-            <a:extLst>
-              <a:ext uri="{FF2B5EF4-FFF2-40B4-BE49-F238E27FC236}">
-                <a16:creationId xmlns:a16="http://schemas.microsoft.com/office/drawing/2014/main" id="{20D7FE48-3101-C09A-8D9B-DFEABB60BC12}"/>
-              </a:ext>
-            </a:extLst>
-          </p:cNvPr>
-          <p:cNvGrpSpPr/>
-          <p:nvPr/>
-        </p:nvGrpSpPr>
-        <p:grpSpPr>
-          <a:xfrm rot="401064" flipH="1">
-            <a:off x="8144745" y="1336191"/>
-            <a:ext cx="476768" cy="470900"/>
-            <a:chOff x="4252781" y="935174"/>
-            <a:chExt cx="476769" cy="470901"/>
-          </a:xfrm>
-        </p:grpSpPr>
-        <p:sp>
-          <p:nvSpPr>
-            <p:cNvPr id="23" name="Google Shape;775;p34">
-              <a:extLst>
-                <a:ext uri="{FF2B5EF4-FFF2-40B4-BE49-F238E27FC236}">
-                  <a16:creationId xmlns:a16="http://schemas.microsoft.com/office/drawing/2014/main" id="{278D33AC-C77D-D52F-8EE7-80D2F97CFD65}"/>
-                </a:ext>
-              </a:extLst>
-            </p:cNvPr>
-            <p:cNvSpPr/>
-            <p:nvPr/>
-          </p:nvSpPr>
-          <p:spPr>
-            <a:xfrm>
-              <a:off x="4285025" y="935175"/>
-              <a:ext cx="444525" cy="470900"/>
-            </a:xfrm>
-            <a:custGeom>
-              <a:avLst/>
-              <a:gdLst/>
-              <a:ahLst/>
-              <a:cxnLst/>
-              <a:rect l="l" t="t" r="r" b="b"/>
-              <a:pathLst>
-                <a:path w="17781" h="18836" extrusionOk="0">
-                  <a:moveTo>
-                    <a:pt x="3775" y="0"/>
-                  </a:moveTo>
-                  <a:cubicBezTo>
-                    <a:pt x="3585" y="0"/>
-                    <a:pt x="3394" y="18"/>
-                    <a:pt x="3203" y="55"/>
-                  </a:cubicBezTo>
-                  <a:cubicBezTo>
-                    <a:pt x="1102" y="456"/>
-                    <a:pt x="1" y="2924"/>
-                    <a:pt x="268" y="5059"/>
-                  </a:cubicBezTo>
-                  <a:cubicBezTo>
-                    <a:pt x="568" y="7160"/>
-                    <a:pt x="1802" y="8995"/>
-                    <a:pt x="2870" y="10830"/>
-                  </a:cubicBezTo>
-                  <a:cubicBezTo>
-                    <a:pt x="4304" y="13365"/>
-                    <a:pt x="5472" y="16033"/>
-                    <a:pt x="6339" y="18835"/>
-                  </a:cubicBezTo>
-                  <a:cubicBezTo>
-                    <a:pt x="10108" y="15166"/>
-                    <a:pt x="13444" y="11063"/>
-                    <a:pt x="16213" y="6593"/>
-                  </a:cubicBezTo>
-                  <a:cubicBezTo>
-                    <a:pt x="17013" y="5326"/>
-                    <a:pt x="17780" y="3925"/>
-                    <a:pt x="17614" y="2457"/>
-                  </a:cubicBezTo>
-                  <a:cubicBezTo>
-                    <a:pt x="17614" y="2123"/>
-                    <a:pt x="17513" y="1823"/>
-                    <a:pt x="17313" y="1556"/>
-                  </a:cubicBezTo>
-                  <a:cubicBezTo>
-                    <a:pt x="17061" y="1274"/>
-                    <a:pt x="16715" y="1164"/>
-                    <a:pt x="16342" y="1164"/>
-                  </a:cubicBezTo>
-                  <a:cubicBezTo>
-                    <a:pt x="15878" y="1164"/>
-                    <a:pt x="15370" y="1334"/>
-                    <a:pt x="14945" y="1556"/>
-                  </a:cubicBezTo>
-                  <a:cubicBezTo>
-                    <a:pt x="12543" y="2824"/>
-                    <a:pt x="10842" y="5059"/>
-                    <a:pt x="9174" y="7160"/>
-                  </a:cubicBezTo>
-                  <a:cubicBezTo>
-                    <a:pt x="8741" y="5426"/>
-                    <a:pt x="8207" y="3424"/>
-                    <a:pt x="7173" y="1957"/>
-                  </a:cubicBezTo>
-                  <a:cubicBezTo>
-                    <a:pt x="6384" y="876"/>
-                    <a:pt x="5110" y="0"/>
-                    <a:pt x="3775" y="0"/>
-                  </a:cubicBezTo>
-                  <a:close/>
-                </a:path>
-              </a:pathLst>
-            </a:custGeom>
-            <a:solidFill>
-              <a:schemeClr val="accent5"/>
-            </a:solidFill>
-            <a:ln>
-              <a:noFill/>
-            </a:ln>
-          </p:spPr>
-          <p:txBody>
-            <a:bodyPr spcFirstLastPara="1" wrap="square" lIns="91425" tIns="91425" rIns="91425" bIns="91425" anchor="ctr" anchorCtr="0">
-              <a:noAutofit/>
-            </a:bodyPr>
-            <a:lstStyle/>
-            <a:p>
-              <a:pPr marL="0" lvl="0" indent="0" algn="l" rtl="0">
-                <a:spcBef>
-                  <a:spcPts val="0"/>
-                </a:spcBef>
-                <a:spcAft>
-                  <a:spcPts val="0"/>
-                </a:spcAft>
-                <a:buNone/>
-              </a:pPr>
-              <a:endParaRPr/>
-            </a:p>
-          </p:txBody>
-        </p:sp>
-        <p:sp>
-          <p:nvSpPr>
-            <p:cNvPr id="24" name="Google Shape;776;p34">
-              <a:extLst>
-                <a:ext uri="{FF2B5EF4-FFF2-40B4-BE49-F238E27FC236}">
-                  <a16:creationId xmlns:a16="http://schemas.microsoft.com/office/drawing/2014/main" id="{82C833E4-8F57-F7E6-FD1E-0A9FE52DF45A}"/>
-                </a:ext>
-              </a:extLst>
-            </p:cNvPr>
-            <p:cNvSpPr/>
-            <p:nvPr/>
-          </p:nvSpPr>
-          <p:spPr>
-            <a:xfrm>
-              <a:off x="4252781" y="935174"/>
-              <a:ext cx="444525" cy="470900"/>
-            </a:xfrm>
-            <a:custGeom>
-              <a:avLst/>
-              <a:gdLst/>
-              <a:ahLst/>
-              <a:cxnLst/>
-              <a:rect l="l" t="t" r="r" b="b"/>
-              <a:pathLst>
-                <a:path w="17781" h="18836" extrusionOk="0">
-                  <a:moveTo>
-                    <a:pt x="3775" y="0"/>
-                  </a:moveTo>
-                  <a:cubicBezTo>
-                    <a:pt x="3585" y="0"/>
-                    <a:pt x="3394" y="18"/>
-                    <a:pt x="3203" y="55"/>
-                  </a:cubicBezTo>
-                  <a:cubicBezTo>
-                    <a:pt x="1102" y="456"/>
-                    <a:pt x="1" y="2924"/>
-                    <a:pt x="268" y="5059"/>
-                  </a:cubicBezTo>
-                  <a:cubicBezTo>
-                    <a:pt x="568" y="7160"/>
-                    <a:pt x="1802" y="8995"/>
-                    <a:pt x="2870" y="10830"/>
-                  </a:cubicBezTo>
-                  <a:cubicBezTo>
-                    <a:pt x="4304" y="13365"/>
-                    <a:pt x="5472" y="16033"/>
-                    <a:pt x="6339" y="18835"/>
-                  </a:cubicBezTo>
-                  <a:cubicBezTo>
-                    <a:pt x="10108" y="15166"/>
-                    <a:pt x="13444" y="11063"/>
-                    <a:pt x="16213" y="6593"/>
-                  </a:cubicBezTo>
-                  <a:cubicBezTo>
-                    <a:pt x="17013" y="5326"/>
-                    <a:pt x="17780" y="3925"/>
-                    <a:pt x="17614" y="2457"/>
-                  </a:cubicBezTo>
-                  <a:cubicBezTo>
-                    <a:pt x="17614" y="2123"/>
-                    <a:pt x="17513" y="1823"/>
-                    <a:pt x="17313" y="1556"/>
-                  </a:cubicBezTo>
-                  <a:cubicBezTo>
-                    <a:pt x="17061" y="1274"/>
-                    <a:pt x="16715" y="1164"/>
-                    <a:pt x="16342" y="1164"/>
-                  </a:cubicBezTo>
-                  <a:cubicBezTo>
-                    <a:pt x="15878" y="1164"/>
-                    <a:pt x="15370" y="1334"/>
-                    <a:pt x="14945" y="1556"/>
-                  </a:cubicBezTo>
-                  <a:cubicBezTo>
-                    <a:pt x="12543" y="2824"/>
-                    <a:pt x="10842" y="5059"/>
-                    <a:pt x="9174" y="7160"/>
-                  </a:cubicBezTo>
-                  <a:cubicBezTo>
-                    <a:pt x="8741" y="5426"/>
-                    <a:pt x="8207" y="3424"/>
-                    <a:pt x="7173" y="1957"/>
-                  </a:cubicBezTo>
-                  <a:cubicBezTo>
-                    <a:pt x="6384" y="876"/>
-                    <a:pt x="5110" y="0"/>
-                    <a:pt x="3775" y="0"/>
-                  </a:cubicBezTo>
-                  <a:close/>
-                </a:path>
-              </a:pathLst>
-            </a:custGeom>
-            <a:noFill/>
-            <a:ln w="19050" cap="flat" cmpd="sng">
-              <a:solidFill>
-                <a:schemeClr val="dk2"/>
-              </a:solidFill>
-              <a:prstDash val="solid"/>
-              <a:round/>
-              <a:headEnd type="none" w="sm" len="sm"/>
-              <a:tailEnd type="none" w="sm" len="sm"/>
-            </a:ln>
-          </p:spPr>
-          <p:txBody>
-            <a:bodyPr spcFirstLastPara="1" wrap="square" lIns="91425" tIns="91425" rIns="91425" bIns="91425" anchor="ctr" anchorCtr="0">
-              <a:noAutofit/>
-            </a:bodyPr>
-            <a:lstStyle/>
-            <a:p>
-              <a:pPr marL="0" lvl="0" indent="0" algn="l" rtl="0">
-                <a:spcBef>
-                  <a:spcPts val="0"/>
-                </a:spcBef>
-                <a:spcAft>
-                  <a:spcPts val="0"/>
-                </a:spcAft>
-                <a:buNone/>
-              </a:pPr>
-              <a:endParaRPr/>
-            </a:p>
-          </p:txBody>
-        </p:sp>
-      </p:grpSp>
     </p:spTree>
     <p:extLst>
       <p:ext uri="{BB962C8B-B14F-4D97-AF65-F5344CB8AC3E}">

</xml_diff>